<commit_message>
init some files, the thermal data socket(desktop part)
</commit_message>
<xml_diff>
--- a/project_documents/AIOT bedroom.pptx
+++ b/project_documents/AIOT bedroom.pptx
@@ -268,7 +268,7 @@
           <a:p>
             <a:fld id="{0DAF61AA-5A98-4049-A93E-477E5505141A}" type="datetimeFigureOut">
               <a:rPr lang="en-US" smtClean="0"/>
-              <a:t>1/5/2023</a:t>
+              <a:t>1/6/2023</a:t>
             </a:fld>
             <a:endParaRPr lang="en-US" dirty="0"/>
           </a:p>
@@ -466,7 +466,7 @@
           <a:p>
             <a:fld id="{0DAF61AA-5A98-4049-A93E-477E5505141A}" type="datetimeFigureOut">
               <a:rPr lang="en-US" smtClean="0"/>
-              <a:t>1/5/2023</a:t>
+              <a:t>1/6/2023</a:t>
             </a:fld>
             <a:endParaRPr lang="en-US"/>
           </a:p>
@@ -674,7 +674,7 @@
           <a:p>
             <a:fld id="{0DAF61AA-5A98-4049-A93E-477E5505141A}" type="datetimeFigureOut">
               <a:rPr lang="en-US" smtClean="0"/>
-              <a:t>1/5/2023</a:t>
+              <a:t>1/6/2023</a:t>
             </a:fld>
             <a:endParaRPr lang="en-US"/>
           </a:p>
@@ -872,7 +872,7 @@
           <a:p>
             <a:fld id="{0DAF61AA-5A98-4049-A93E-477E5505141A}" type="datetimeFigureOut">
               <a:rPr lang="en-US" smtClean="0"/>
-              <a:t>1/5/2023</a:t>
+              <a:t>1/6/2023</a:t>
             </a:fld>
             <a:endParaRPr lang="en-US"/>
           </a:p>
@@ -1147,7 +1147,7 @@
           <a:p>
             <a:fld id="{0DAF61AA-5A98-4049-A93E-477E5505141A}" type="datetimeFigureOut">
               <a:rPr lang="en-US" smtClean="0"/>
-              <a:t>1/5/2023</a:t>
+              <a:t>1/6/2023</a:t>
             </a:fld>
             <a:endParaRPr lang="en-US"/>
           </a:p>
@@ -1412,7 +1412,7 @@
           <a:p>
             <a:fld id="{0DAF61AA-5A98-4049-A93E-477E5505141A}" type="datetimeFigureOut">
               <a:rPr lang="en-US" smtClean="0"/>
-              <a:t>1/5/2023</a:t>
+              <a:t>1/6/2023</a:t>
             </a:fld>
             <a:endParaRPr lang="en-US"/>
           </a:p>
@@ -1824,7 +1824,7 @@
           <a:p>
             <a:fld id="{0DAF61AA-5A98-4049-A93E-477E5505141A}" type="datetimeFigureOut">
               <a:rPr lang="en-US" smtClean="0"/>
-              <a:t>1/5/2023</a:t>
+              <a:t>1/6/2023</a:t>
             </a:fld>
             <a:endParaRPr lang="en-US"/>
           </a:p>
@@ -1965,7 +1965,7 @@
           <a:p>
             <a:fld id="{0DAF61AA-5A98-4049-A93E-477E5505141A}" type="datetimeFigureOut">
               <a:rPr lang="en-US" smtClean="0"/>
-              <a:t>1/5/2023</a:t>
+              <a:t>1/6/2023</a:t>
             </a:fld>
             <a:endParaRPr lang="en-US"/>
           </a:p>
@@ -2078,7 +2078,7 @@
           <a:p>
             <a:fld id="{0DAF61AA-5A98-4049-A93E-477E5505141A}" type="datetimeFigureOut">
               <a:rPr lang="en-US" smtClean="0"/>
-              <a:t>1/5/2023</a:t>
+              <a:t>1/6/2023</a:t>
             </a:fld>
             <a:endParaRPr lang="en-US"/>
           </a:p>
@@ -2389,7 +2389,7 @@
           <a:p>
             <a:fld id="{0DAF61AA-5A98-4049-A93E-477E5505141A}" type="datetimeFigureOut">
               <a:rPr lang="en-US" smtClean="0"/>
-              <a:t>1/5/2023</a:t>
+              <a:t>1/6/2023</a:t>
             </a:fld>
             <a:endParaRPr lang="en-US"/>
           </a:p>
@@ -2680,7 +2680,7 @@
           <a:p>
             <a:fld id="{0DAF61AA-5A98-4049-A93E-477E5505141A}" type="datetimeFigureOut">
               <a:rPr lang="en-US" smtClean="0"/>
-              <a:t>1/5/2023</a:t>
+              <a:t>1/6/2023</a:t>
             </a:fld>
             <a:endParaRPr lang="en-US"/>
           </a:p>
@@ -6364,7 +6364,7 @@
             <a:fld id="{0DAF61AA-5A98-4049-A93E-477E5505141A}" type="datetimeFigureOut">
               <a:rPr lang="en-US" smtClean="0"/>
               <a:pPr/>
-              <a:t>1/5/2023</a:t>
+              <a:t>1/6/2023</a:t>
             </a:fld>
             <a:endParaRPr lang="en-US" dirty="0"/>
           </a:p>
@@ -14016,7 +14016,7 @@
           <a:p>
             <a:r>
               <a:rPr lang="en-US" dirty="0"/>
-              <a:t>Real life problem</a:t>
+              <a:t>Real life problem </a:t>
             </a:r>
             <a:endParaRPr lang="LID4096" dirty="0"/>
           </a:p>

</xml_diff>

<commit_message>
Add danger detection, fix connection bugs, improve networking Poster almost fin only reqire yt video
</commit_message>
<xml_diff>
--- a/project_documents/AIOT bedroom.pptx
+++ b/project_documents/AIOT bedroom.pptx
@@ -11,12 +11,18 @@
     <p:sldId id="262" r:id="rId5"/>
     <p:sldId id="263" r:id="rId6"/>
     <p:sldId id="269" r:id="rId7"/>
-    <p:sldId id="264" r:id="rId8"/>
-    <p:sldId id="265" r:id="rId9"/>
-    <p:sldId id="266" r:id="rId10"/>
-    <p:sldId id="268" r:id="rId11"/>
-    <p:sldId id="261" r:id="rId12"/>
-    <p:sldId id="267" r:id="rId13"/>
+    <p:sldId id="270" r:id="rId8"/>
+    <p:sldId id="264" r:id="rId9"/>
+    <p:sldId id="265" r:id="rId10"/>
+    <p:sldId id="266" r:id="rId11"/>
+    <p:sldId id="271" r:id="rId12"/>
+    <p:sldId id="272" r:id="rId13"/>
+    <p:sldId id="273" r:id="rId14"/>
+    <p:sldId id="275" r:id="rId15"/>
+    <p:sldId id="274" r:id="rId16"/>
+    <p:sldId id="268" r:id="rId17"/>
+    <p:sldId id="261" r:id="rId18"/>
+    <p:sldId id="267" r:id="rId19"/>
   </p:sldIdLst>
   <p:sldSz cx="12192000" cy="6858000"/>
   <p:notesSz cx="6858000" cy="9144000"/>
@@ -270,7 +276,7 @@
           <a:p>
             <a:fld id="{0DAF61AA-5A98-4049-A93E-477E5505141A}" type="datetimeFigureOut">
               <a:rPr lang="en-US" smtClean="0"/>
-              <a:t>1/28/2023</a:t>
+              <a:t>2/4/2023</a:t>
             </a:fld>
             <a:endParaRPr lang="en-US" dirty="0"/>
           </a:p>
@@ -468,7 +474,7 @@
           <a:p>
             <a:fld id="{0DAF61AA-5A98-4049-A93E-477E5505141A}" type="datetimeFigureOut">
               <a:rPr lang="en-US" smtClean="0"/>
-              <a:t>1/28/2023</a:t>
+              <a:t>2/4/2023</a:t>
             </a:fld>
             <a:endParaRPr lang="en-US"/>
           </a:p>
@@ -676,7 +682,7 @@
           <a:p>
             <a:fld id="{0DAF61AA-5A98-4049-A93E-477E5505141A}" type="datetimeFigureOut">
               <a:rPr lang="en-US" smtClean="0"/>
-              <a:t>1/28/2023</a:t>
+              <a:t>2/4/2023</a:t>
             </a:fld>
             <a:endParaRPr lang="en-US"/>
           </a:p>
@@ -874,7 +880,7 @@
           <a:p>
             <a:fld id="{0DAF61AA-5A98-4049-A93E-477E5505141A}" type="datetimeFigureOut">
               <a:rPr lang="en-US" smtClean="0"/>
-              <a:t>1/28/2023</a:t>
+              <a:t>2/4/2023</a:t>
             </a:fld>
             <a:endParaRPr lang="en-US"/>
           </a:p>
@@ -1149,7 +1155,7 @@
           <a:p>
             <a:fld id="{0DAF61AA-5A98-4049-A93E-477E5505141A}" type="datetimeFigureOut">
               <a:rPr lang="en-US" smtClean="0"/>
-              <a:t>1/28/2023</a:t>
+              <a:t>2/4/2023</a:t>
             </a:fld>
             <a:endParaRPr lang="en-US"/>
           </a:p>
@@ -1414,7 +1420,7 @@
           <a:p>
             <a:fld id="{0DAF61AA-5A98-4049-A93E-477E5505141A}" type="datetimeFigureOut">
               <a:rPr lang="en-US" smtClean="0"/>
-              <a:t>1/28/2023</a:t>
+              <a:t>2/4/2023</a:t>
             </a:fld>
             <a:endParaRPr lang="en-US"/>
           </a:p>
@@ -1826,7 +1832,7 @@
           <a:p>
             <a:fld id="{0DAF61AA-5A98-4049-A93E-477E5505141A}" type="datetimeFigureOut">
               <a:rPr lang="en-US" smtClean="0"/>
-              <a:t>1/28/2023</a:t>
+              <a:t>2/4/2023</a:t>
             </a:fld>
             <a:endParaRPr lang="en-US"/>
           </a:p>
@@ -1967,7 +1973,7 @@
           <a:p>
             <a:fld id="{0DAF61AA-5A98-4049-A93E-477E5505141A}" type="datetimeFigureOut">
               <a:rPr lang="en-US" smtClean="0"/>
-              <a:t>1/28/2023</a:t>
+              <a:t>2/4/2023</a:t>
             </a:fld>
             <a:endParaRPr lang="en-US"/>
           </a:p>
@@ -2080,7 +2086,7 @@
           <a:p>
             <a:fld id="{0DAF61AA-5A98-4049-A93E-477E5505141A}" type="datetimeFigureOut">
               <a:rPr lang="en-US" smtClean="0"/>
-              <a:t>1/28/2023</a:t>
+              <a:t>2/4/2023</a:t>
             </a:fld>
             <a:endParaRPr lang="en-US"/>
           </a:p>
@@ -2391,7 +2397,7 @@
           <a:p>
             <a:fld id="{0DAF61AA-5A98-4049-A93E-477E5505141A}" type="datetimeFigureOut">
               <a:rPr lang="en-US" smtClean="0"/>
-              <a:t>1/28/2023</a:t>
+              <a:t>2/4/2023</a:t>
             </a:fld>
             <a:endParaRPr lang="en-US"/>
           </a:p>
@@ -2682,7 +2688,7 @@
           <a:p>
             <a:fld id="{0DAF61AA-5A98-4049-A93E-477E5505141A}" type="datetimeFigureOut">
               <a:rPr lang="en-US" smtClean="0"/>
-              <a:t>1/28/2023</a:t>
+              <a:t>2/4/2023</a:t>
             </a:fld>
             <a:endParaRPr lang="en-US"/>
           </a:p>
@@ -6366,7 +6372,7 @@
             <a:fld id="{0DAF61AA-5A98-4049-A93E-477E5505141A}" type="datetimeFigureOut">
               <a:rPr lang="en-US" smtClean="0"/>
               <a:pPr/>
-              <a:t>1/28/2023</a:t>
+              <a:t>2/4/2023</a:t>
             </a:fld>
             <a:endParaRPr lang="en-US" dirty="0"/>
           </a:p>
@@ -13934,7 +13940,7 @@
           <p:cNvPr id="2" name="标题 1">
             <a:extLst>
               <a:ext uri="{FF2B5EF4-FFF2-40B4-BE49-F238E27FC236}">
-                <a16:creationId xmlns:a16="http://schemas.microsoft.com/office/drawing/2014/main" id="{7397D73D-850F-F36D-500F-FB708096423D}"/>
+                <a16:creationId xmlns:a16="http://schemas.microsoft.com/office/drawing/2014/main" id="{D4F39F02-032A-B8CA-673C-8D5BECC0F1C9}"/>
               </a:ext>
             </a:extLst>
           </p:cNvPr>
@@ -13951,8 +13957,8 @@
           <a:lstStyle/>
           <a:p>
             <a:r>
-              <a:rPr lang="en-US" dirty="0"/>
-              <a:t>How does it earn?</a:t>
+              <a:rPr lang="en-HK" dirty="0"/>
+              <a:t>How does it work --- Extensibility</a:t>
             </a:r>
             <a:endParaRPr lang="LID4096" dirty="0"/>
           </a:p>
@@ -13963,7 +13969,7 @@
           <p:cNvPr id="3" name="内容占位符 2">
             <a:extLst>
               <a:ext uri="{FF2B5EF4-FFF2-40B4-BE49-F238E27FC236}">
-                <a16:creationId xmlns:a16="http://schemas.microsoft.com/office/drawing/2014/main" id="{09D2E42D-C3F9-4193-5D18-5023F9EDAB05}"/>
+                <a16:creationId xmlns:a16="http://schemas.microsoft.com/office/drawing/2014/main" id="{C428FED5-79EE-7352-242B-A39719AA8DC2}"/>
               </a:ext>
             </a:extLst>
           </p:cNvPr>
@@ -13980,28 +13986,82 @@
           <a:lstStyle/>
           <a:p>
             <a:r>
-              <a:rPr lang="en-US" dirty="0"/>
-              <a:t>Selling the IR camera</a:t>
+              <a:rPr lang="en-HK" dirty="0"/>
+              <a:t>Two ways to extend</a:t>
             </a:r>
           </a:p>
           <a:p>
+            <a:pPr marL="514350" indent="-514350">
+              <a:buFont typeface="+mj-lt"/>
+              <a:buAutoNum type="arabicPeriod"/>
+            </a:pPr>
             <a:r>
-              <a:rPr lang="en-US" dirty="0"/>
-              <a:t>Selling other smart home product to integrate with environment</a:t>
+              <a:rPr lang="en-HK" dirty="0"/>
+              <a:t>Add new IoT devices</a:t>
             </a:r>
           </a:p>
           <a:p>
+            <a:pPr marL="971550" lvl="1" indent="-514350">
+              <a:buFont typeface="+mj-lt"/>
+              <a:buAutoNum type="arabicPeriod"/>
+            </a:pPr>
             <a:r>
-              <a:rPr lang="en-US" dirty="0"/>
-              <a:t>High extensibility make this possible</a:t>
+              <a:rPr lang="en-HK" dirty="0"/>
+              <a:t>Auto detect new devices(network / camera-&gt;Events)</a:t>
             </a:r>
+          </a:p>
+          <a:p>
+            <a:pPr marL="971550" lvl="1" indent="-514350">
+              <a:buFont typeface="+mj-lt"/>
+              <a:buAutoNum type="arabicPeriod"/>
+            </a:pPr>
+            <a:r>
+              <a:rPr lang="en-HK" dirty="0"/>
+              <a:t>Include to the environment</a:t>
+            </a:r>
+          </a:p>
+          <a:p>
+            <a:pPr marL="514350" indent="-514350">
+              <a:buFont typeface="+mj-lt"/>
+              <a:buAutoNum type="arabicPeriod"/>
+            </a:pPr>
+            <a:r>
+              <a:rPr lang="en-HK" dirty="0"/>
+              <a:t>Add other non-IoT objects</a:t>
+            </a:r>
+          </a:p>
+          <a:p>
+            <a:pPr marL="971550" lvl="1" indent="-514350">
+              <a:buFont typeface="+mj-lt"/>
+              <a:buAutoNum type="arabicPeriod"/>
+            </a:pPr>
+            <a:r>
+              <a:rPr lang="en-HK" dirty="0"/>
+              <a:t>Auto detect new object(camera-&gt;Events)</a:t>
+            </a:r>
+          </a:p>
+          <a:p>
+            <a:pPr marL="971550" lvl="1" indent="-514350">
+              <a:buFont typeface="+mj-lt"/>
+              <a:buAutoNum type="arabicPeriod"/>
+            </a:pPr>
+            <a:r>
+              <a:rPr lang="en-HK" dirty="0"/>
+              <a:t>Remind you to use it, etc.</a:t>
+            </a:r>
+          </a:p>
+          <a:p>
+            <a:pPr marL="0" indent="0">
+              <a:buNone/>
+            </a:pPr>
+            <a:endParaRPr lang="LID4096" dirty="0"/>
           </a:p>
         </p:txBody>
       </p:sp>
     </p:spTree>
     <p:extLst>
       <p:ext uri="{BB962C8B-B14F-4D97-AF65-F5344CB8AC3E}">
-        <p14:creationId xmlns:p14="http://schemas.microsoft.com/office/powerpoint/2010/main" val="2205000807"/>
+        <p14:creationId xmlns:p14="http://schemas.microsoft.com/office/powerpoint/2010/main" val="433792788"/>
       </p:ext>
     </p:extLst>
   </p:cSld>
@@ -14033,6 +14093,658 @@
           <p:cNvPr id="2" name="标题 1">
             <a:extLst>
               <a:ext uri="{FF2B5EF4-FFF2-40B4-BE49-F238E27FC236}">
+                <a16:creationId xmlns:a16="http://schemas.microsoft.com/office/drawing/2014/main" id="{18D2755B-C77D-4C13-5EA8-1823BFB318E2}"/>
+              </a:ext>
+            </a:extLst>
+          </p:cNvPr>
+          <p:cNvSpPr>
+            <a:spLocks noGrp="1"/>
+          </p:cNvSpPr>
+          <p:nvPr>
+            <p:ph type="title"/>
+          </p:nvPr>
+        </p:nvSpPr>
+        <p:spPr/>
+        <p:txBody>
+          <a:bodyPr/>
+          <a:lstStyle/>
+          <a:p>
+            <a:r>
+              <a:rPr lang="en-US" dirty="0"/>
+              <a:t>Automations</a:t>
+            </a:r>
+            <a:endParaRPr lang="LID4096" dirty="0"/>
+          </a:p>
+        </p:txBody>
+      </p:sp>
+      <p:sp>
+        <p:nvSpPr>
+          <p:cNvPr id="3" name="内容占位符 2">
+            <a:extLst>
+              <a:ext uri="{FF2B5EF4-FFF2-40B4-BE49-F238E27FC236}">
+                <a16:creationId xmlns:a16="http://schemas.microsoft.com/office/drawing/2014/main" id="{C2B657A3-CE60-0D20-4D01-22B8E779B540}"/>
+              </a:ext>
+            </a:extLst>
+          </p:cNvPr>
+          <p:cNvSpPr>
+            <a:spLocks noGrp="1"/>
+          </p:cNvSpPr>
+          <p:nvPr>
+            <p:ph idx="1"/>
+          </p:nvPr>
+        </p:nvSpPr>
+        <p:spPr/>
+        <p:txBody>
+          <a:bodyPr/>
+          <a:lstStyle/>
+          <a:p>
+            <a:pPr marL="0" indent="0">
+              <a:buNone/>
+            </a:pPr>
+            <a:r>
+              <a:rPr lang="en-US" dirty="0"/>
+              <a:t>With all of these constraints, we can have dozens of automation.</a:t>
+            </a:r>
+            <a:endParaRPr lang="LID4096" dirty="0"/>
+          </a:p>
+        </p:txBody>
+      </p:sp>
+    </p:spTree>
+    <p:extLst>
+      <p:ext uri="{BB962C8B-B14F-4D97-AF65-F5344CB8AC3E}">
+        <p14:creationId xmlns:p14="http://schemas.microsoft.com/office/powerpoint/2010/main" val="4229519513"/>
+      </p:ext>
+    </p:extLst>
+  </p:cSld>
+  <p:clrMapOvr>
+    <a:masterClrMapping/>
+  </p:clrMapOvr>
+</p:sld>
+</file>
+
+<file path=ppt/slides/slide12.xml><?xml version="1.0" encoding="utf-8"?>
+<p:sld xmlns:a="http://schemas.openxmlformats.org/drawingml/2006/main" xmlns:r="http://schemas.openxmlformats.org/officeDocument/2006/relationships" xmlns:p="http://schemas.openxmlformats.org/presentationml/2006/main">
+  <p:cSld>
+    <p:spTree>
+      <p:nvGrpSpPr>
+        <p:cNvPr id="1" name=""/>
+        <p:cNvGrpSpPr/>
+        <p:nvPr/>
+      </p:nvGrpSpPr>
+      <p:grpSpPr>
+        <a:xfrm>
+          <a:off x="0" y="0"/>
+          <a:ext cx="0" cy="0"/>
+          <a:chOff x="0" y="0"/>
+          <a:chExt cx="0" cy="0"/>
+        </a:xfrm>
+      </p:grpSpPr>
+      <p:sp>
+        <p:nvSpPr>
+          <p:cNvPr id="2" name="标题 1">
+            <a:extLst>
+              <a:ext uri="{FF2B5EF4-FFF2-40B4-BE49-F238E27FC236}">
+                <a16:creationId xmlns:a16="http://schemas.microsoft.com/office/drawing/2014/main" id="{9D5BF9DC-EA38-1D0F-FDE1-C7B780C9C44A}"/>
+              </a:ext>
+            </a:extLst>
+          </p:cNvPr>
+          <p:cNvSpPr>
+            <a:spLocks noGrp="1"/>
+          </p:cNvSpPr>
+          <p:nvPr>
+            <p:ph type="title"/>
+          </p:nvPr>
+        </p:nvSpPr>
+        <p:spPr/>
+        <p:txBody>
+          <a:bodyPr/>
+          <a:lstStyle/>
+          <a:p>
+            <a:r>
+              <a:rPr lang="en-US" dirty="0"/>
+              <a:t>Automations – Best Temperature</a:t>
+            </a:r>
+            <a:endParaRPr lang="LID4096" dirty="0"/>
+          </a:p>
+        </p:txBody>
+      </p:sp>
+      <p:sp>
+        <p:nvSpPr>
+          <p:cNvPr id="3" name="内容占位符 2">
+            <a:extLst>
+              <a:ext uri="{FF2B5EF4-FFF2-40B4-BE49-F238E27FC236}">
+                <a16:creationId xmlns:a16="http://schemas.microsoft.com/office/drawing/2014/main" id="{B5D6123C-C057-E33C-668D-C8F550B43557}"/>
+              </a:ext>
+            </a:extLst>
+          </p:cNvPr>
+          <p:cNvSpPr>
+            <a:spLocks noGrp="1"/>
+          </p:cNvSpPr>
+          <p:nvPr>
+            <p:ph idx="1"/>
+          </p:nvPr>
+        </p:nvSpPr>
+        <p:spPr/>
+        <p:txBody>
+          <a:bodyPr/>
+          <a:lstStyle/>
+          <a:p>
+            <a:r>
+              <a:rPr lang="en-US" dirty="0"/>
+              <a:t>We can collect the bed and human temperature</a:t>
+            </a:r>
+          </a:p>
+          <a:p>
+            <a:r>
+              <a:rPr lang="en-US" dirty="0" err="1"/>
+              <a:t>i.e</a:t>
+            </a:r>
+            <a:r>
+              <a:rPr lang="en-US" dirty="0"/>
+              <a:t> </a:t>
+            </a:r>
+          </a:p>
+          <a:p>
+            <a:pPr lvl="1"/>
+            <a:r>
+              <a:rPr lang="en-US" dirty="0"/>
+              <a:t>controlling the air-con to keep bed temperature on 27-31°C</a:t>
+            </a:r>
+          </a:p>
+          <a:p>
+            <a:pPr lvl="1"/>
+            <a:r>
+              <a:rPr lang="en-US" dirty="0"/>
+              <a:t>Detect the skin temperature of human to prevent too cold or hot</a:t>
+            </a:r>
+          </a:p>
+        </p:txBody>
+      </p:sp>
+    </p:spTree>
+    <p:extLst>
+      <p:ext uri="{BB962C8B-B14F-4D97-AF65-F5344CB8AC3E}">
+        <p14:creationId xmlns:p14="http://schemas.microsoft.com/office/powerpoint/2010/main" val="2380261329"/>
+      </p:ext>
+    </p:extLst>
+  </p:cSld>
+  <p:clrMapOvr>
+    <a:masterClrMapping/>
+  </p:clrMapOvr>
+</p:sld>
+</file>
+
+<file path=ppt/slides/slide13.xml><?xml version="1.0" encoding="utf-8"?>
+<p:sld xmlns:a="http://schemas.openxmlformats.org/drawingml/2006/main" xmlns:r="http://schemas.openxmlformats.org/officeDocument/2006/relationships" xmlns:p="http://schemas.openxmlformats.org/presentationml/2006/main">
+  <p:cSld>
+    <p:spTree>
+      <p:nvGrpSpPr>
+        <p:cNvPr id="1" name=""/>
+        <p:cNvGrpSpPr/>
+        <p:nvPr/>
+      </p:nvGrpSpPr>
+      <p:grpSpPr>
+        <a:xfrm>
+          <a:off x="0" y="0"/>
+          <a:ext cx="0" cy="0"/>
+          <a:chOff x="0" y="0"/>
+          <a:chExt cx="0" cy="0"/>
+        </a:xfrm>
+      </p:grpSpPr>
+      <p:sp>
+        <p:nvSpPr>
+          <p:cNvPr id="2" name="标题 1">
+            <a:extLst>
+              <a:ext uri="{FF2B5EF4-FFF2-40B4-BE49-F238E27FC236}">
+                <a16:creationId xmlns:a16="http://schemas.microsoft.com/office/drawing/2014/main" id="{A81A392E-F885-F933-2514-8F6C8A756D25}"/>
+              </a:ext>
+            </a:extLst>
+          </p:cNvPr>
+          <p:cNvSpPr>
+            <a:spLocks noGrp="1"/>
+          </p:cNvSpPr>
+          <p:nvPr>
+            <p:ph type="title"/>
+          </p:nvPr>
+        </p:nvSpPr>
+        <p:spPr/>
+        <p:txBody>
+          <a:bodyPr/>
+          <a:lstStyle/>
+          <a:p>
+            <a:r>
+              <a:rPr lang="en-US" dirty="0"/>
+              <a:t>Automations – Auto lights</a:t>
+            </a:r>
+            <a:endParaRPr lang="LID4096" dirty="0"/>
+          </a:p>
+        </p:txBody>
+      </p:sp>
+      <p:sp>
+        <p:nvSpPr>
+          <p:cNvPr id="3" name="内容占位符 2">
+            <a:extLst>
+              <a:ext uri="{FF2B5EF4-FFF2-40B4-BE49-F238E27FC236}">
+                <a16:creationId xmlns:a16="http://schemas.microsoft.com/office/drawing/2014/main" id="{A6A02661-B332-3350-A848-8D1917707F5C}"/>
+              </a:ext>
+            </a:extLst>
+          </p:cNvPr>
+          <p:cNvSpPr>
+            <a:spLocks noGrp="1"/>
+          </p:cNvSpPr>
+          <p:nvPr>
+            <p:ph idx="1"/>
+          </p:nvPr>
+        </p:nvSpPr>
+        <p:spPr/>
+        <p:txBody>
+          <a:bodyPr/>
+          <a:lstStyle/>
+          <a:p>
+            <a:r>
+              <a:rPr lang="en-US" dirty="0"/>
+              <a:t>Detection of human’s </a:t>
+            </a:r>
+            <a:r>
+              <a:rPr lang="en-US" dirty="0" err="1"/>
+              <a:t>gestrure</a:t>
+            </a:r>
+            <a:endParaRPr lang="en-US" dirty="0"/>
+          </a:p>
+          <a:p>
+            <a:pPr lvl="1"/>
+            <a:r>
+              <a:rPr lang="en-US" dirty="0"/>
+              <a:t>If human is lying on bed and not touching a phone</a:t>
+            </a:r>
+          </a:p>
+          <a:p>
+            <a:pPr lvl="2"/>
+            <a:r>
+              <a:rPr lang="en-US" dirty="0"/>
+              <a:t>We turn off the lights</a:t>
+            </a:r>
+          </a:p>
+          <a:p>
+            <a:pPr lvl="1"/>
+            <a:r>
+              <a:rPr lang="en-US" dirty="0"/>
+              <a:t>If human is awake </a:t>
+            </a:r>
+          </a:p>
+          <a:p>
+            <a:pPr lvl="2"/>
+            <a:r>
+              <a:rPr lang="en-US" dirty="0"/>
+              <a:t>We turn on the  lights</a:t>
+            </a:r>
+          </a:p>
+        </p:txBody>
+      </p:sp>
+    </p:spTree>
+    <p:extLst>
+      <p:ext uri="{BB962C8B-B14F-4D97-AF65-F5344CB8AC3E}">
+        <p14:creationId xmlns:p14="http://schemas.microsoft.com/office/powerpoint/2010/main" val="404436072"/>
+      </p:ext>
+    </p:extLst>
+  </p:cSld>
+  <p:clrMapOvr>
+    <a:masterClrMapping/>
+  </p:clrMapOvr>
+</p:sld>
+</file>
+
+<file path=ppt/slides/slide14.xml><?xml version="1.0" encoding="utf-8"?>
+<p:sld xmlns:a="http://schemas.openxmlformats.org/drawingml/2006/main" xmlns:r="http://schemas.openxmlformats.org/officeDocument/2006/relationships" xmlns:p="http://schemas.openxmlformats.org/presentationml/2006/main">
+  <p:cSld>
+    <p:spTree>
+      <p:nvGrpSpPr>
+        <p:cNvPr id="1" name=""/>
+        <p:cNvGrpSpPr/>
+        <p:nvPr/>
+      </p:nvGrpSpPr>
+      <p:grpSpPr>
+        <a:xfrm>
+          <a:off x="0" y="0"/>
+          <a:ext cx="0" cy="0"/>
+          <a:chOff x="0" y="0"/>
+          <a:chExt cx="0" cy="0"/>
+        </a:xfrm>
+      </p:grpSpPr>
+      <p:sp>
+        <p:nvSpPr>
+          <p:cNvPr id="2" name="标题 1">
+            <a:extLst>
+              <a:ext uri="{FF2B5EF4-FFF2-40B4-BE49-F238E27FC236}">
+                <a16:creationId xmlns:a16="http://schemas.microsoft.com/office/drawing/2014/main" id="{E3C6381A-0947-4C2A-44B5-C5445F292CDE}"/>
+              </a:ext>
+            </a:extLst>
+          </p:cNvPr>
+          <p:cNvSpPr>
+            <a:spLocks noGrp="1"/>
+          </p:cNvSpPr>
+          <p:nvPr>
+            <p:ph type="title"/>
+          </p:nvPr>
+        </p:nvSpPr>
+        <p:spPr/>
+        <p:txBody>
+          <a:bodyPr/>
+          <a:lstStyle/>
+          <a:p>
+            <a:r>
+              <a:rPr lang="en-US" dirty="0"/>
+              <a:t>Automation – Danger detections</a:t>
+            </a:r>
+            <a:endParaRPr lang="LID4096" dirty="0"/>
+          </a:p>
+        </p:txBody>
+      </p:sp>
+      <p:sp>
+        <p:nvSpPr>
+          <p:cNvPr id="3" name="内容占位符 2">
+            <a:extLst>
+              <a:ext uri="{FF2B5EF4-FFF2-40B4-BE49-F238E27FC236}">
+                <a16:creationId xmlns:a16="http://schemas.microsoft.com/office/drawing/2014/main" id="{B7473B00-731B-F169-3127-50B378B7786C}"/>
+              </a:ext>
+            </a:extLst>
+          </p:cNvPr>
+          <p:cNvSpPr>
+            <a:spLocks noGrp="1"/>
+          </p:cNvSpPr>
+          <p:nvPr>
+            <p:ph idx="1"/>
+          </p:nvPr>
+        </p:nvSpPr>
+        <p:spPr/>
+        <p:txBody>
+          <a:bodyPr/>
+          <a:lstStyle/>
+          <a:p>
+            <a:r>
+              <a:rPr lang="en-US" dirty="0"/>
+              <a:t>See if a human sleeping of the bed </a:t>
+            </a:r>
+            <a:r>
+              <a:rPr lang="en-US" dirty="0" err="1"/>
+              <a:t>actidentally</a:t>
+            </a:r>
+            <a:endParaRPr lang="en-US" dirty="0"/>
+          </a:p>
+          <a:p>
+            <a:pPr lvl="1"/>
+            <a:r>
+              <a:rPr lang="en-US" dirty="0"/>
+              <a:t>Call for ambulance if needed</a:t>
+            </a:r>
+          </a:p>
+          <a:p>
+            <a:r>
+              <a:rPr lang="en-US" dirty="0"/>
+              <a:t>Loosing temperature </a:t>
+            </a:r>
+            <a:r>
+              <a:rPr lang="en-US" dirty="0" err="1"/>
+              <a:t>rapidily</a:t>
+            </a:r>
+            <a:endParaRPr lang="en-US" dirty="0"/>
+          </a:p>
+          <a:p>
+            <a:pPr lvl="1"/>
+            <a:r>
+              <a:rPr lang="en-US" dirty="0"/>
+              <a:t>Call for ambulance</a:t>
+            </a:r>
+            <a:endParaRPr lang="LID4096" dirty="0"/>
+          </a:p>
+        </p:txBody>
+      </p:sp>
+    </p:spTree>
+    <p:extLst>
+      <p:ext uri="{BB962C8B-B14F-4D97-AF65-F5344CB8AC3E}">
+        <p14:creationId xmlns:p14="http://schemas.microsoft.com/office/powerpoint/2010/main" val="3267289826"/>
+      </p:ext>
+    </p:extLst>
+  </p:cSld>
+  <p:clrMapOvr>
+    <a:masterClrMapping/>
+  </p:clrMapOvr>
+</p:sld>
+</file>
+
+<file path=ppt/slides/slide15.xml><?xml version="1.0" encoding="utf-8"?>
+<p:sld xmlns:a="http://schemas.openxmlformats.org/drawingml/2006/main" xmlns:r="http://schemas.openxmlformats.org/officeDocument/2006/relationships" xmlns:p="http://schemas.openxmlformats.org/presentationml/2006/main">
+  <p:cSld>
+    <p:spTree>
+      <p:nvGrpSpPr>
+        <p:cNvPr id="1" name=""/>
+        <p:cNvGrpSpPr/>
+        <p:nvPr/>
+      </p:nvGrpSpPr>
+      <p:grpSpPr>
+        <a:xfrm>
+          <a:off x="0" y="0"/>
+          <a:ext cx="0" cy="0"/>
+          <a:chOff x="0" y="0"/>
+          <a:chExt cx="0" cy="0"/>
+        </a:xfrm>
+      </p:grpSpPr>
+      <p:sp>
+        <p:nvSpPr>
+          <p:cNvPr id="2" name="标题 1">
+            <a:extLst>
+              <a:ext uri="{FF2B5EF4-FFF2-40B4-BE49-F238E27FC236}">
+                <a16:creationId xmlns:a16="http://schemas.microsoft.com/office/drawing/2014/main" id="{D5E4DA4B-7987-7CAA-AD8F-D9EF4F9A2CD7}"/>
+              </a:ext>
+            </a:extLst>
+          </p:cNvPr>
+          <p:cNvSpPr>
+            <a:spLocks noGrp="1"/>
+          </p:cNvSpPr>
+          <p:nvPr>
+            <p:ph type="title"/>
+          </p:nvPr>
+        </p:nvSpPr>
+        <p:spPr/>
+        <p:txBody>
+          <a:bodyPr/>
+          <a:lstStyle/>
+          <a:p>
+            <a:r>
+              <a:rPr lang="en-US" dirty="0"/>
+              <a:t>Automations – Your habits</a:t>
+            </a:r>
+            <a:endParaRPr lang="LID4096" dirty="0"/>
+          </a:p>
+        </p:txBody>
+      </p:sp>
+      <p:sp>
+        <p:nvSpPr>
+          <p:cNvPr id="3" name="内容占位符 2">
+            <a:extLst>
+              <a:ext uri="{FF2B5EF4-FFF2-40B4-BE49-F238E27FC236}">
+                <a16:creationId xmlns:a16="http://schemas.microsoft.com/office/drawing/2014/main" id="{75034F5F-0829-BA85-4EBB-78386BEEB4BC}"/>
+              </a:ext>
+            </a:extLst>
+          </p:cNvPr>
+          <p:cNvSpPr>
+            <a:spLocks noGrp="1"/>
+          </p:cNvSpPr>
+          <p:nvPr>
+            <p:ph idx="1"/>
+          </p:nvPr>
+        </p:nvSpPr>
+        <p:spPr/>
+        <p:txBody>
+          <a:bodyPr/>
+          <a:lstStyle/>
+          <a:p>
+            <a:r>
+              <a:rPr lang="en-US" dirty="0"/>
+              <a:t>Just include your habits with all </a:t>
+            </a:r>
+            <a:r>
+              <a:rPr lang="en-US" dirty="0" err="1"/>
+              <a:t>thses</a:t>
+            </a:r>
+            <a:r>
+              <a:rPr lang="en-US" dirty="0"/>
+              <a:t> constraints</a:t>
+            </a:r>
+          </a:p>
+          <a:p>
+            <a:r>
+              <a:rPr lang="en-US" dirty="0"/>
+              <a:t>Like start playing music when lying on bed</a:t>
+            </a:r>
+          </a:p>
+          <a:p>
+            <a:r>
+              <a:rPr lang="en-US" dirty="0"/>
+              <a:t>Turn off the air con on mid night</a:t>
+            </a:r>
+          </a:p>
+          <a:p>
+            <a:r>
+              <a:rPr lang="en-US" dirty="0"/>
+              <a:t>Turn on the air con before sleep</a:t>
+            </a:r>
+          </a:p>
+        </p:txBody>
+      </p:sp>
+    </p:spTree>
+    <p:extLst>
+      <p:ext uri="{BB962C8B-B14F-4D97-AF65-F5344CB8AC3E}">
+        <p14:creationId xmlns:p14="http://schemas.microsoft.com/office/powerpoint/2010/main" val="1329885861"/>
+      </p:ext>
+    </p:extLst>
+  </p:cSld>
+  <p:clrMapOvr>
+    <a:masterClrMapping/>
+  </p:clrMapOvr>
+</p:sld>
+</file>
+
+<file path=ppt/slides/slide16.xml><?xml version="1.0" encoding="utf-8"?>
+<p:sld xmlns:a="http://schemas.openxmlformats.org/drawingml/2006/main" xmlns:r="http://schemas.openxmlformats.org/officeDocument/2006/relationships" xmlns:p="http://schemas.openxmlformats.org/presentationml/2006/main">
+  <p:cSld>
+    <p:spTree>
+      <p:nvGrpSpPr>
+        <p:cNvPr id="1" name=""/>
+        <p:cNvGrpSpPr/>
+        <p:nvPr/>
+      </p:nvGrpSpPr>
+      <p:grpSpPr>
+        <a:xfrm>
+          <a:off x="0" y="0"/>
+          <a:ext cx="0" cy="0"/>
+          <a:chOff x="0" y="0"/>
+          <a:chExt cx="0" cy="0"/>
+        </a:xfrm>
+      </p:grpSpPr>
+      <p:sp>
+        <p:nvSpPr>
+          <p:cNvPr id="2" name="标题 1">
+            <a:extLst>
+              <a:ext uri="{FF2B5EF4-FFF2-40B4-BE49-F238E27FC236}">
+                <a16:creationId xmlns:a16="http://schemas.microsoft.com/office/drawing/2014/main" id="{7397D73D-850F-F36D-500F-FB708096423D}"/>
+              </a:ext>
+            </a:extLst>
+          </p:cNvPr>
+          <p:cNvSpPr>
+            <a:spLocks noGrp="1"/>
+          </p:cNvSpPr>
+          <p:nvPr>
+            <p:ph type="title"/>
+          </p:nvPr>
+        </p:nvSpPr>
+        <p:spPr/>
+        <p:txBody>
+          <a:bodyPr/>
+          <a:lstStyle/>
+          <a:p>
+            <a:r>
+              <a:rPr lang="en-US" dirty="0"/>
+              <a:t>How does it earn?</a:t>
+            </a:r>
+            <a:endParaRPr lang="LID4096" dirty="0"/>
+          </a:p>
+        </p:txBody>
+      </p:sp>
+      <p:sp>
+        <p:nvSpPr>
+          <p:cNvPr id="3" name="内容占位符 2">
+            <a:extLst>
+              <a:ext uri="{FF2B5EF4-FFF2-40B4-BE49-F238E27FC236}">
+                <a16:creationId xmlns:a16="http://schemas.microsoft.com/office/drawing/2014/main" id="{09D2E42D-C3F9-4193-5D18-5023F9EDAB05}"/>
+              </a:ext>
+            </a:extLst>
+          </p:cNvPr>
+          <p:cNvSpPr>
+            <a:spLocks noGrp="1"/>
+          </p:cNvSpPr>
+          <p:nvPr>
+            <p:ph idx="1"/>
+          </p:nvPr>
+        </p:nvSpPr>
+        <p:spPr/>
+        <p:txBody>
+          <a:bodyPr/>
+          <a:lstStyle/>
+          <a:p>
+            <a:r>
+              <a:rPr lang="en-US" dirty="0"/>
+              <a:t>Selling the IR camera</a:t>
+            </a:r>
+          </a:p>
+          <a:p>
+            <a:r>
+              <a:rPr lang="en-US" dirty="0"/>
+              <a:t>Selling other smart home product to integrate with environment</a:t>
+            </a:r>
+          </a:p>
+          <a:p>
+            <a:r>
+              <a:rPr lang="en-US" dirty="0"/>
+              <a:t>High extensibility make this possible</a:t>
+            </a:r>
+          </a:p>
+        </p:txBody>
+      </p:sp>
+    </p:spTree>
+    <p:extLst>
+      <p:ext uri="{BB962C8B-B14F-4D97-AF65-F5344CB8AC3E}">
+        <p14:creationId xmlns:p14="http://schemas.microsoft.com/office/powerpoint/2010/main" val="2205000807"/>
+      </p:ext>
+    </p:extLst>
+  </p:cSld>
+  <p:clrMapOvr>
+    <a:masterClrMapping/>
+  </p:clrMapOvr>
+</p:sld>
+</file>
+
+<file path=ppt/slides/slide17.xml><?xml version="1.0" encoding="utf-8"?>
+<p:sld xmlns:a="http://schemas.openxmlformats.org/drawingml/2006/main" xmlns:r="http://schemas.openxmlformats.org/officeDocument/2006/relationships" xmlns:p="http://schemas.openxmlformats.org/presentationml/2006/main">
+  <p:cSld>
+    <p:spTree>
+      <p:nvGrpSpPr>
+        <p:cNvPr id="1" name=""/>
+        <p:cNvGrpSpPr/>
+        <p:nvPr/>
+      </p:nvGrpSpPr>
+      <p:grpSpPr>
+        <a:xfrm>
+          <a:off x="0" y="0"/>
+          <a:ext cx="0" cy="0"/>
+          <a:chOff x="0" y="0"/>
+          <a:chExt cx="0" cy="0"/>
+        </a:xfrm>
+      </p:grpSpPr>
+      <p:sp>
+        <p:nvSpPr>
+          <p:cNvPr id="2" name="标题 1">
+            <a:extLst>
+              <a:ext uri="{FF2B5EF4-FFF2-40B4-BE49-F238E27FC236}">
                 <a16:creationId xmlns:a16="http://schemas.microsoft.com/office/drawing/2014/main" id="{E7B662D3-02AA-FC1F-F214-E6F80BFB47C1}"/>
               </a:ext>
             </a:extLst>
@@ -14105,7 +14817,7 @@
 </p:sld>
 </file>
 
-<file path=ppt/slides/slide12.xml><?xml version="1.0" encoding="utf-8"?>
+<file path=ppt/slides/slide18.xml><?xml version="1.0" encoding="utf-8"?>
 <p:sld xmlns:a="http://schemas.openxmlformats.org/drawingml/2006/main" xmlns:r="http://schemas.openxmlformats.org/officeDocument/2006/relationships" xmlns:p="http://schemas.openxmlformats.org/presentationml/2006/main">
   <p:cSld>
     <p:spTree>
@@ -15032,14 +15744,23 @@
             <a:pPr lvl="1"/>
             <a:r>
               <a:rPr lang="en-US" dirty="0"/>
-              <a:t>Get the image(high privacy)</a:t>
+              <a:t>The temperature of the environment</a:t>
+            </a:r>
+          </a:p>
+          <a:p>
+            <a:endParaRPr lang="en-US" dirty="0"/>
+          </a:p>
+          <a:p>
+            <a:r>
+              <a:rPr lang="en-US" altLang="zh-CN" dirty="0"/>
+              <a:t> Visual camera</a:t>
             </a:r>
           </a:p>
           <a:p>
             <a:pPr lvl="1"/>
             <a:r>
               <a:rPr lang="en-US" dirty="0"/>
-              <a:t>The temperature of the environment</a:t>
+              <a:t> Get the image(high privacy)</a:t>
             </a:r>
           </a:p>
           <a:p>
@@ -15052,7 +15773,7 @@
             </a:r>
           </a:p>
           <a:p>
-            <a:pPr marL="457200" lvl="1" indent="0">
+            <a:pPr marL="0" indent="0">
               <a:buNone/>
             </a:pPr>
             <a:r>
@@ -15317,13 +16038,6 @@
             </a:r>
           </a:p>
           <a:p>
-            <a:pPr lvl="1"/>
-            <a:r>
-              <a:rPr lang="en-US" dirty="0"/>
-              <a:t>Much better than HD camera</a:t>
-            </a:r>
-          </a:p>
-          <a:p>
             <a:r>
               <a:rPr lang="en-US" dirty="0"/>
               <a:t>More useful constraints</a:t>
@@ -15390,7 +16104,7 @@
           <p:cNvPr id="2" name="标题 1">
             <a:extLst>
               <a:ext uri="{FF2B5EF4-FFF2-40B4-BE49-F238E27FC236}">
-                <a16:creationId xmlns:a16="http://schemas.microsoft.com/office/drawing/2014/main" id="{53B035D4-D2FF-D537-5789-58021E23D17C}"/>
+                <a16:creationId xmlns:a16="http://schemas.microsoft.com/office/drawing/2014/main" id="{8BE09337-CA4A-1EAF-9056-9B2B233422F2}"/>
               </a:ext>
             </a:extLst>
           </p:cNvPr>
@@ -15407,8 +16121,8 @@
           <a:lstStyle/>
           <a:p>
             <a:r>
-              <a:rPr lang="en-HK" dirty="0"/>
-              <a:t>How does it work --- AI </a:t>
+              <a:rPr lang="en-US" dirty="0"/>
+              <a:t>Limitation of IR camera</a:t>
             </a:r>
             <a:endParaRPr lang="LID4096" dirty="0"/>
           </a:p>
@@ -15419,7 +16133,7 @@
           <p:cNvPr id="3" name="内容占位符 2">
             <a:extLst>
               <a:ext uri="{FF2B5EF4-FFF2-40B4-BE49-F238E27FC236}">
-                <a16:creationId xmlns:a16="http://schemas.microsoft.com/office/drawing/2014/main" id="{69B60FFF-35C4-C28C-17E4-06A6F51D1F9D}"/>
+                <a16:creationId xmlns:a16="http://schemas.microsoft.com/office/drawing/2014/main" id="{A0ABD11C-EEAB-16BC-ABC2-8959B39B38CB}"/>
               </a:ext>
             </a:extLst>
           </p:cNvPr>
@@ -15436,186 +16150,63 @@
           <a:lstStyle/>
           <a:p>
             <a:r>
-              <a:rPr lang="en-HK" dirty="0"/>
-              <a:t>Object detection</a:t>
+              <a:rPr lang="en-US" dirty="0"/>
+              <a:t>Lack of datasets</a:t>
             </a:r>
           </a:p>
           <a:p>
             <a:pPr lvl="1"/>
             <a:r>
-              <a:rPr lang="en-HK" dirty="0"/>
-              <a:t>Detect the position of person</a:t>
+              <a:rPr lang="en-US" dirty="0"/>
+              <a:t>Do not have a good dataset</a:t>
+            </a:r>
+          </a:p>
+          <a:p>
+            <a:r>
+              <a:rPr lang="en-US" dirty="0"/>
+              <a:t>Inconsistent image formats</a:t>
             </a:r>
           </a:p>
           <a:p>
             <a:pPr lvl="1"/>
             <a:r>
-              <a:rPr lang="en-HK" dirty="0"/>
-              <a:t>Detect the gesture of person</a:t>
+              <a:rPr lang="en-US" dirty="0"/>
+              <a:t>Even there are some dataset outside,</a:t>
+            </a:r>
+          </a:p>
+          <a:p>
+            <a:pPr lvl="1"/>
+            <a:r>
+              <a:rPr lang="en-US" dirty="0"/>
+              <a:t>That may not be compatible</a:t>
+            </a:r>
+          </a:p>
+          <a:p>
+            <a:r>
+              <a:rPr lang="en-US" dirty="0"/>
+              <a:t>Result</a:t>
+            </a:r>
+          </a:p>
+          <a:p>
+            <a:pPr lvl="1"/>
+            <a:r>
+              <a:rPr lang="en-US" dirty="0"/>
+              <a:t>Use the visual image for now</a:t>
+            </a:r>
+          </a:p>
+          <a:p>
+            <a:pPr lvl="1"/>
+            <a:r>
+              <a:rPr lang="en-US" dirty="0"/>
+              <a:t>We can change it for future</a:t>
             </a:r>
           </a:p>
         </p:txBody>
       </p:sp>
-      <p:pic>
-        <p:nvPicPr>
-          <p:cNvPr id="5" name="图形 4" descr="鞋印 轮廓">
-            <a:extLst>
-              <a:ext uri="{FF2B5EF4-FFF2-40B4-BE49-F238E27FC236}">
-                <a16:creationId xmlns:a16="http://schemas.microsoft.com/office/drawing/2014/main" id="{81AA6EB8-5242-1A86-9A37-D74CEA17C5ED}"/>
-              </a:ext>
-            </a:extLst>
-          </p:cNvPr>
-          <p:cNvPicPr>
-            <a:picLocks noChangeAspect="1"/>
-          </p:cNvPicPr>
-          <p:nvPr/>
-        </p:nvPicPr>
-        <p:blipFill>
-          <a:blip r:embed="rId2">
-            <a:extLst>
-              <a:ext uri="{28A0092B-C50C-407E-A947-70E740481C1C}">
-                <a14:useLocalDpi xmlns:a14="http://schemas.microsoft.com/office/drawing/2010/main" val="0"/>
-              </a:ext>
-              <a:ext uri="{96DAC541-7B7A-43D3-8B79-37D633B846F1}">
-                <asvg:svgBlip xmlns:asvg="http://schemas.microsoft.com/office/drawing/2016/SVG/main" r:embed="rId3"/>
-              </a:ext>
-            </a:extLst>
-          </a:blip>
-          <a:stretch>
-            <a:fillRect/>
-          </a:stretch>
-        </p:blipFill>
-        <p:spPr>
-          <a:xfrm>
-            <a:off x="7516411" y="4500339"/>
-            <a:ext cx="1338773" cy="1338773"/>
-          </a:xfrm>
-          <a:prstGeom prst="rect">
-            <a:avLst/>
-          </a:prstGeom>
-        </p:spPr>
-      </p:pic>
-      <p:pic>
-        <p:nvPicPr>
-          <p:cNvPr id="7" name="图形 6" descr="翻页日历 轮廓">
-            <a:extLst>
-              <a:ext uri="{FF2B5EF4-FFF2-40B4-BE49-F238E27FC236}">
-                <a16:creationId xmlns:a16="http://schemas.microsoft.com/office/drawing/2014/main" id="{AFCC019C-1498-F24E-60DA-A7D8CC466375}"/>
-              </a:ext>
-            </a:extLst>
-          </p:cNvPr>
-          <p:cNvPicPr>
-            <a:picLocks noChangeAspect="1"/>
-          </p:cNvPicPr>
-          <p:nvPr/>
-        </p:nvPicPr>
-        <p:blipFill>
-          <a:blip r:embed="rId4">
-            <a:extLst>
-              <a:ext uri="{28A0092B-C50C-407E-A947-70E740481C1C}">
-                <a14:useLocalDpi xmlns:a14="http://schemas.microsoft.com/office/drawing/2010/main" val="0"/>
-              </a:ext>
-              <a:ext uri="{96DAC541-7B7A-43D3-8B79-37D633B846F1}">
-                <asvg:svgBlip xmlns:asvg="http://schemas.microsoft.com/office/drawing/2016/SVG/main" r:embed="rId5"/>
-              </a:ext>
-            </a:extLst>
-          </a:blip>
-          <a:stretch>
-            <a:fillRect/>
-          </a:stretch>
-        </p:blipFill>
-        <p:spPr>
-          <a:xfrm>
-            <a:off x="9488652" y="2405025"/>
-            <a:ext cx="1472650" cy="1472650"/>
-          </a:xfrm>
-          <a:prstGeom prst="rect">
-            <a:avLst/>
-          </a:prstGeom>
-        </p:spPr>
-      </p:pic>
-      <p:pic>
-        <p:nvPicPr>
-          <p:cNvPr id="9" name="图形 8" descr="流程图 轮廓">
-            <a:extLst>
-              <a:ext uri="{FF2B5EF4-FFF2-40B4-BE49-F238E27FC236}">
-                <a16:creationId xmlns:a16="http://schemas.microsoft.com/office/drawing/2014/main" id="{EEC66155-BA6B-B1C9-4713-D6478A005607}"/>
-              </a:ext>
-            </a:extLst>
-          </p:cNvPr>
-          <p:cNvPicPr>
-            <a:picLocks noChangeAspect="1"/>
-          </p:cNvPicPr>
-          <p:nvPr/>
-        </p:nvPicPr>
-        <p:blipFill>
-          <a:blip r:embed="rId6">
-            <a:extLst>
-              <a:ext uri="{28A0092B-C50C-407E-A947-70E740481C1C}">
-                <a14:useLocalDpi xmlns:a14="http://schemas.microsoft.com/office/drawing/2010/main" val="0"/>
-              </a:ext>
-              <a:ext uri="{96DAC541-7B7A-43D3-8B79-37D633B846F1}">
-                <asvg:svgBlip xmlns:asvg="http://schemas.microsoft.com/office/drawing/2016/SVG/main" r:embed="rId7"/>
-              </a:ext>
-            </a:extLst>
-          </a:blip>
-          <a:stretch>
-            <a:fillRect/>
-          </a:stretch>
-        </p:blipFill>
-        <p:spPr>
-          <a:xfrm>
-            <a:off x="7382534" y="2528644"/>
-            <a:ext cx="1472650" cy="1472650"/>
-          </a:xfrm>
-          <a:prstGeom prst="rect">
-            <a:avLst/>
-          </a:prstGeom>
-        </p:spPr>
-      </p:pic>
-      <p:pic>
-        <p:nvPicPr>
-          <p:cNvPr id="11" name="图形 10" descr="鞋印 纯色填充">
-            <a:extLst>
-              <a:ext uri="{FF2B5EF4-FFF2-40B4-BE49-F238E27FC236}">
-                <a16:creationId xmlns:a16="http://schemas.microsoft.com/office/drawing/2014/main" id="{EF54478C-ED86-6FFA-2C2B-4C366E2CA89C}"/>
-              </a:ext>
-            </a:extLst>
-          </p:cNvPr>
-          <p:cNvPicPr>
-            <a:picLocks noChangeAspect="1"/>
-          </p:cNvPicPr>
-          <p:nvPr/>
-        </p:nvPicPr>
-        <p:blipFill>
-          <a:blip r:embed="rId8">
-            <a:extLst>
-              <a:ext uri="{28A0092B-C50C-407E-A947-70E740481C1C}">
-                <a14:useLocalDpi xmlns:a14="http://schemas.microsoft.com/office/drawing/2010/main" val="0"/>
-              </a:ext>
-              <a:ext uri="{96DAC541-7B7A-43D3-8B79-37D633B846F1}">
-                <asvg:svgBlip xmlns:asvg="http://schemas.microsoft.com/office/drawing/2016/SVG/main" r:embed="rId9"/>
-              </a:ext>
-            </a:extLst>
-          </a:blip>
-          <a:stretch>
-            <a:fillRect/>
-          </a:stretch>
-        </p:blipFill>
-        <p:spPr>
-          <a:xfrm>
-            <a:off x="9488652" y="4500339"/>
-            <a:ext cx="1338773" cy="1338773"/>
-          </a:xfrm>
-          <a:prstGeom prst="rect">
-            <a:avLst/>
-          </a:prstGeom>
-        </p:spPr>
-      </p:pic>
     </p:spTree>
     <p:extLst>
       <p:ext uri="{BB962C8B-B14F-4D97-AF65-F5344CB8AC3E}">
-        <p14:creationId xmlns:p14="http://schemas.microsoft.com/office/powerpoint/2010/main" val="2257045940"/>
+        <p14:creationId xmlns:p14="http://schemas.microsoft.com/office/powerpoint/2010/main" val="2215705449"/>
       </p:ext>
     </p:extLst>
   </p:cSld>
@@ -15647,7 +16238,7 @@
           <p:cNvPr id="2" name="标题 1">
             <a:extLst>
               <a:ext uri="{FF2B5EF4-FFF2-40B4-BE49-F238E27FC236}">
-                <a16:creationId xmlns:a16="http://schemas.microsoft.com/office/drawing/2014/main" id="{DB64FCBF-08F0-5EC5-8248-93F6D7FF22C2}"/>
+                <a16:creationId xmlns:a16="http://schemas.microsoft.com/office/drawing/2014/main" id="{53B035D4-D2FF-D537-5789-58021E23D17C}"/>
               </a:ext>
             </a:extLst>
           </p:cNvPr>
@@ -15665,7 +16256,7 @@
           <a:p>
             <a:r>
               <a:rPr lang="en-HK" dirty="0"/>
-              <a:t>How does it work --- IoT</a:t>
+              <a:t>How does it work --- AI </a:t>
             </a:r>
             <a:endParaRPr lang="LID4096" dirty="0"/>
           </a:p>
@@ -15676,7 +16267,7 @@
           <p:cNvPr id="3" name="内容占位符 2">
             <a:extLst>
               <a:ext uri="{FF2B5EF4-FFF2-40B4-BE49-F238E27FC236}">
-                <a16:creationId xmlns:a16="http://schemas.microsoft.com/office/drawing/2014/main" id="{834AFF02-D5F8-7C26-6F32-E54490C26AD5}"/>
+                <a16:creationId xmlns:a16="http://schemas.microsoft.com/office/drawing/2014/main" id="{69B60FFF-35C4-C28C-17E4-06A6F51D1F9D}"/>
               </a:ext>
             </a:extLst>
           </p:cNvPr>
@@ -15694,58 +16285,45 @@
           <a:p>
             <a:r>
               <a:rPr lang="en-HK" dirty="0"/>
-              <a:t>Two kind of triggering different devices</a:t>
-            </a:r>
-          </a:p>
-          <a:p>
-            <a:pPr marL="514350" indent="-514350">
-              <a:buFont typeface="+mj-lt"/>
-              <a:buAutoNum type="arabicPeriod"/>
-            </a:pPr>
-            <a:r>
-              <a:rPr lang="en-HK" dirty="0"/>
-              <a:t>Events triggering</a:t>
+              <a:t>Object detection</a:t>
             </a:r>
           </a:p>
           <a:p>
             <a:pPr lvl="1"/>
             <a:r>
               <a:rPr lang="en-HK" dirty="0"/>
-              <a:t>Different kind of body gesture</a:t>
+              <a:t>Detect the position of person</a:t>
             </a:r>
           </a:p>
           <a:p>
             <a:pPr lvl="1"/>
             <a:r>
               <a:rPr lang="en-HK" dirty="0"/>
-              <a:t>Temperature change</a:t>
-            </a:r>
-          </a:p>
-          <a:p>
-            <a:pPr marL="457200" indent="-457200">
-              <a:buFont typeface="+mj-lt"/>
-              <a:buAutoNum type="arabicPeriod"/>
-            </a:pPr>
-            <a:r>
-              <a:rPr lang="en-HK" dirty="0"/>
-              <a:t>Habit trigger</a:t>
+              <a:t>Detect the gesture of person</a:t>
             </a:r>
           </a:p>
           <a:p>
             <a:pPr lvl="1"/>
             <a:r>
               <a:rPr lang="en-HK" dirty="0"/>
-              <a:t>Turn on air-conditioner before sleep time</a:t>
+              <a:t>Detect the position of bed</a:t>
+            </a:r>
+          </a:p>
+          <a:p>
+            <a:pPr lvl="1"/>
+            <a:r>
+              <a:rPr lang="en-HK" dirty="0"/>
+              <a:t>Detect the position of phones</a:t>
             </a:r>
           </a:p>
         </p:txBody>
       </p:sp>
       <p:pic>
         <p:nvPicPr>
-          <p:cNvPr id="5" name="图形 4" descr="分支图 轮廓">
+          <p:cNvPr id="5" name="图形 4" descr="鞋印 轮廓">
             <a:extLst>
               <a:ext uri="{FF2B5EF4-FFF2-40B4-BE49-F238E27FC236}">
-                <a16:creationId xmlns:a16="http://schemas.microsoft.com/office/drawing/2014/main" id="{43BED43D-A5CB-A6F5-5A7A-B7FCCA95319C}"/>
+                <a16:creationId xmlns:a16="http://schemas.microsoft.com/office/drawing/2014/main" id="{81AA6EB8-5242-1A86-9A37-D74CEA17C5ED}"/>
               </a:ext>
             </a:extLst>
           </p:cNvPr>
@@ -15771,8 +16349,8 @@
         </p:blipFill>
         <p:spPr>
           <a:xfrm>
-            <a:off x="8207582" y="2473872"/>
-            <a:ext cx="1472650" cy="1472650"/>
+            <a:off x="7516411" y="4500339"/>
+            <a:ext cx="1338773" cy="1338773"/>
           </a:xfrm>
           <a:prstGeom prst="rect">
             <a:avLst/>
@@ -15781,10 +16359,10 @@
       </p:pic>
       <p:pic>
         <p:nvPicPr>
-          <p:cNvPr id="9" name="图形 8" descr="自行车与人 轮廓">
+          <p:cNvPr id="7" name="图形 6" descr="翻页日历 轮廓">
             <a:extLst>
               <a:ext uri="{FF2B5EF4-FFF2-40B4-BE49-F238E27FC236}">
-                <a16:creationId xmlns:a16="http://schemas.microsoft.com/office/drawing/2014/main" id="{F1034632-ECB4-209E-5577-0AAA3067B73B}"/>
+                <a16:creationId xmlns:a16="http://schemas.microsoft.com/office/drawing/2014/main" id="{AFCC019C-1498-F24E-60DA-A7D8CC466375}"/>
               </a:ext>
             </a:extLst>
           </p:cNvPr>
@@ -15810,8 +16388,8 @@
         </p:blipFill>
         <p:spPr>
           <a:xfrm>
-            <a:off x="9683330" y="2540810"/>
-            <a:ext cx="1338773" cy="1338773"/>
+            <a:off x="9488652" y="2405025"/>
+            <a:ext cx="1472650" cy="1472650"/>
           </a:xfrm>
           <a:prstGeom prst="rect">
             <a:avLst/>
@@ -15820,10 +16398,10 @@
       </p:pic>
       <p:pic>
         <p:nvPicPr>
-          <p:cNvPr id="11" name="图形 10" descr="处理器 轮廓">
+          <p:cNvPr id="9" name="图形 8" descr="流程图 轮廓">
             <a:extLst>
               <a:ext uri="{FF2B5EF4-FFF2-40B4-BE49-F238E27FC236}">
-                <a16:creationId xmlns:a16="http://schemas.microsoft.com/office/drawing/2014/main" id="{50885517-F1C8-080C-7312-73692CC13318}"/>
+                <a16:creationId xmlns:a16="http://schemas.microsoft.com/office/drawing/2014/main" id="{EEC66155-BA6B-B1C9-4713-D6478A005607}"/>
               </a:ext>
             </a:extLst>
           </p:cNvPr>
@@ -15849,8 +16427,8 @@
         </p:blipFill>
         <p:spPr>
           <a:xfrm>
-            <a:off x="9680232" y="4220093"/>
-            <a:ext cx="1338773" cy="1338773"/>
+            <a:off x="7382534" y="2528644"/>
+            <a:ext cx="1472650" cy="1472650"/>
           </a:xfrm>
           <a:prstGeom prst="rect">
             <a:avLst/>
@@ -15859,10 +16437,10 @@
       </p:pic>
       <p:pic>
         <p:nvPicPr>
-          <p:cNvPr id="13" name="图形 12" descr="居家办公 Wi-Fi 轮廓">
+          <p:cNvPr id="11" name="图形 10" descr="鞋印 纯色填充">
             <a:extLst>
               <a:ext uri="{FF2B5EF4-FFF2-40B4-BE49-F238E27FC236}">
-                <a16:creationId xmlns:a16="http://schemas.microsoft.com/office/drawing/2014/main" id="{99EE22EC-E065-C7E9-22CC-369DB9FBBF51}"/>
+                <a16:creationId xmlns:a16="http://schemas.microsoft.com/office/drawing/2014/main" id="{EF54478C-ED86-6FFA-2C2B-4C366E2CA89C}"/>
               </a:ext>
             </a:extLst>
           </p:cNvPr>
@@ -15888,7 +16466,7 @@
         </p:blipFill>
         <p:spPr>
           <a:xfrm>
-            <a:off x="8207582" y="4220093"/>
+            <a:off x="9488652" y="4500339"/>
             <a:ext cx="1338773" cy="1338773"/>
           </a:xfrm>
           <a:prstGeom prst="rect">
@@ -15899,7 +16477,7 @@
     </p:spTree>
     <p:extLst>
       <p:ext uri="{BB962C8B-B14F-4D97-AF65-F5344CB8AC3E}">
-        <p14:creationId xmlns:p14="http://schemas.microsoft.com/office/powerpoint/2010/main" val="2067688863"/>
+        <p14:creationId xmlns:p14="http://schemas.microsoft.com/office/powerpoint/2010/main" val="2257045940"/>
       </p:ext>
     </p:extLst>
   </p:cSld>
@@ -15931,7 +16509,7 @@
           <p:cNvPr id="2" name="标题 1">
             <a:extLst>
               <a:ext uri="{FF2B5EF4-FFF2-40B4-BE49-F238E27FC236}">
-                <a16:creationId xmlns:a16="http://schemas.microsoft.com/office/drawing/2014/main" id="{D4F39F02-032A-B8CA-673C-8D5BECC0F1C9}"/>
+                <a16:creationId xmlns:a16="http://schemas.microsoft.com/office/drawing/2014/main" id="{DB64FCBF-08F0-5EC5-8248-93F6D7FF22C2}"/>
               </a:ext>
             </a:extLst>
           </p:cNvPr>
@@ -15949,7 +16527,7 @@
           <a:p>
             <a:r>
               <a:rPr lang="en-HK" dirty="0"/>
-              <a:t>How does it work --- Extensibility</a:t>
+              <a:t>How does it work --- IoT</a:t>
             </a:r>
             <a:endParaRPr lang="LID4096" dirty="0"/>
           </a:p>
@@ -15960,7 +16538,7 @@
           <p:cNvPr id="3" name="内容占位符 2">
             <a:extLst>
               <a:ext uri="{FF2B5EF4-FFF2-40B4-BE49-F238E27FC236}">
-                <a16:creationId xmlns:a16="http://schemas.microsoft.com/office/drawing/2014/main" id="{C428FED5-79EE-7352-242B-A39719AA8DC2}"/>
+                <a16:creationId xmlns:a16="http://schemas.microsoft.com/office/drawing/2014/main" id="{834AFF02-D5F8-7C26-6F32-E54490C26AD5}"/>
               </a:ext>
             </a:extLst>
           </p:cNvPr>
@@ -15978,7 +16556,7 @@
           <a:p>
             <a:r>
               <a:rPr lang="en-HK" dirty="0"/>
-              <a:t>Two ways to extend</a:t>
+              <a:t>Two kind of triggering different devices</a:t>
             </a:r>
           </a:p>
           <a:p>
@@ -15988,71 +16566,202 @@
             </a:pPr>
             <a:r>
               <a:rPr lang="en-HK" dirty="0"/>
-              <a:t>Add new IoT devices</a:t>
+              <a:t>Events triggering</a:t>
             </a:r>
           </a:p>
           <a:p>
-            <a:pPr marL="971550" lvl="1" indent="-514350">
+            <a:pPr lvl="1"/>
+            <a:r>
+              <a:rPr lang="en-HK" dirty="0"/>
+              <a:t>Different kind of body gesture</a:t>
+            </a:r>
+          </a:p>
+          <a:p>
+            <a:pPr lvl="1"/>
+            <a:r>
+              <a:rPr lang="en-HK" dirty="0"/>
+              <a:t>Temperature change</a:t>
+            </a:r>
+          </a:p>
+          <a:p>
+            <a:pPr marL="457200" indent="-457200">
               <a:buFont typeface="+mj-lt"/>
               <a:buAutoNum type="arabicPeriod"/>
             </a:pPr>
             <a:r>
               <a:rPr lang="en-HK" dirty="0"/>
-              <a:t>Auto detect new devices(network / camera-&gt;Events)</a:t>
+              <a:t>Habit trigger</a:t>
             </a:r>
           </a:p>
           <a:p>
-            <a:pPr marL="971550" lvl="1" indent="-514350">
-              <a:buFont typeface="+mj-lt"/>
-              <a:buAutoNum type="arabicPeriod"/>
-            </a:pPr>
+            <a:pPr lvl="1"/>
             <a:r>
               <a:rPr lang="en-HK" dirty="0"/>
-              <a:t>Include to the environment</a:t>
+              <a:t>Turn on air-conditioner before sleep time</a:t>
             </a:r>
-          </a:p>
-          <a:p>
-            <a:pPr marL="514350" indent="-514350">
-              <a:buFont typeface="+mj-lt"/>
-              <a:buAutoNum type="arabicPeriod"/>
-            </a:pPr>
-            <a:r>
-              <a:rPr lang="en-HK" dirty="0"/>
-              <a:t>Add other non-IoT objects</a:t>
-            </a:r>
-          </a:p>
-          <a:p>
-            <a:pPr marL="971550" lvl="1" indent="-514350">
-              <a:buFont typeface="+mj-lt"/>
-              <a:buAutoNum type="arabicPeriod"/>
-            </a:pPr>
-            <a:r>
-              <a:rPr lang="en-HK" dirty="0"/>
-              <a:t>Auto detect new object(camera-&gt;Events)</a:t>
-            </a:r>
-          </a:p>
-          <a:p>
-            <a:pPr marL="971550" lvl="1" indent="-514350">
-              <a:buFont typeface="+mj-lt"/>
-              <a:buAutoNum type="arabicPeriod"/>
-            </a:pPr>
-            <a:r>
-              <a:rPr lang="en-HK" dirty="0"/>
-              <a:t>Remind you to use it, etc.</a:t>
-            </a:r>
-          </a:p>
-          <a:p>
-            <a:pPr marL="0" indent="0">
-              <a:buNone/>
-            </a:pPr>
-            <a:endParaRPr lang="LID4096" dirty="0"/>
           </a:p>
         </p:txBody>
       </p:sp>
+      <p:pic>
+        <p:nvPicPr>
+          <p:cNvPr id="5" name="图形 4" descr="分支图 轮廓">
+            <a:extLst>
+              <a:ext uri="{FF2B5EF4-FFF2-40B4-BE49-F238E27FC236}">
+                <a16:creationId xmlns:a16="http://schemas.microsoft.com/office/drawing/2014/main" id="{43BED43D-A5CB-A6F5-5A7A-B7FCCA95319C}"/>
+              </a:ext>
+            </a:extLst>
+          </p:cNvPr>
+          <p:cNvPicPr>
+            <a:picLocks noChangeAspect="1"/>
+          </p:cNvPicPr>
+          <p:nvPr/>
+        </p:nvPicPr>
+        <p:blipFill>
+          <a:blip r:embed="rId2">
+            <a:extLst>
+              <a:ext uri="{28A0092B-C50C-407E-A947-70E740481C1C}">
+                <a14:useLocalDpi xmlns:a14="http://schemas.microsoft.com/office/drawing/2010/main" val="0"/>
+              </a:ext>
+              <a:ext uri="{96DAC541-7B7A-43D3-8B79-37D633B846F1}">
+                <asvg:svgBlip xmlns:asvg="http://schemas.microsoft.com/office/drawing/2016/SVG/main" r:embed="rId3"/>
+              </a:ext>
+            </a:extLst>
+          </a:blip>
+          <a:stretch>
+            <a:fillRect/>
+          </a:stretch>
+        </p:blipFill>
+        <p:spPr>
+          <a:xfrm>
+            <a:off x="8207582" y="2473872"/>
+            <a:ext cx="1472650" cy="1472650"/>
+          </a:xfrm>
+          <a:prstGeom prst="rect">
+            <a:avLst/>
+          </a:prstGeom>
+        </p:spPr>
+      </p:pic>
+      <p:pic>
+        <p:nvPicPr>
+          <p:cNvPr id="9" name="图形 8" descr="自行车与人 轮廓">
+            <a:extLst>
+              <a:ext uri="{FF2B5EF4-FFF2-40B4-BE49-F238E27FC236}">
+                <a16:creationId xmlns:a16="http://schemas.microsoft.com/office/drawing/2014/main" id="{F1034632-ECB4-209E-5577-0AAA3067B73B}"/>
+              </a:ext>
+            </a:extLst>
+          </p:cNvPr>
+          <p:cNvPicPr>
+            <a:picLocks noChangeAspect="1"/>
+          </p:cNvPicPr>
+          <p:nvPr/>
+        </p:nvPicPr>
+        <p:blipFill>
+          <a:blip r:embed="rId4">
+            <a:extLst>
+              <a:ext uri="{28A0092B-C50C-407E-A947-70E740481C1C}">
+                <a14:useLocalDpi xmlns:a14="http://schemas.microsoft.com/office/drawing/2010/main" val="0"/>
+              </a:ext>
+              <a:ext uri="{96DAC541-7B7A-43D3-8B79-37D633B846F1}">
+                <asvg:svgBlip xmlns:asvg="http://schemas.microsoft.com/office/drawing/2016/SVG/main" r:embed="rId5"/>
+              </a:ext>
+            </a:extLst>
+          </a:blip>
+          <a:stretch>
+            <a:fillRect/>
+          </a:stretch>
+        </p:blipFill>
+        <p:spPr>
+          <a:xfrm>
+            <a:off x="9683330" y="2540810"/>
+            <a:ext cx="1338773" cy="1338773"/>
+          </a:xfrm>
+          <a:prstGeom prst="rect">
+            <a:avLst/>
+          </a:prstGeom>
+        </p:spPr>
+      </p:pic>
+      <p:pic>
+        <p:nvPicPr>
+          <p:cNvPr id="11" name="图形 10" descr="处理器 轮廓">
+            <a:extLst>
+              <a:ext uri="{FF2B5EF4-FFF2-40B4-BE49-F238E27FC236}">
+                <a16:creationId xmlns:a16="http://schemas.microsoft.com/office/drawing/2014/main" id="{50885517-F1C8-080C-7312-73692CC13318}"/>
+              </a:ext>
+            </a:extLst>
+          </p:cNvPr>
+          <p:cNvPicPr>
+            <a:picLocks noChangeAspect="1"/>
+          </p:cNvPicPr>
+          <p:nvPr/>
+        </p:nvPicPr>
+        <p:blipFill>
+          <a:blip r:embed="rId6">
+            <a:extLst>
+              <a:ext uri="{28A0092B-C50C-407E-A947-70E740481C1C}">
+                <a14:useLocalDpi xmlns:a14="http://schemas.microsoft.com/office/drawing/2010/main" val="0"/>
+              </a:ext>
+              <a:ext uri="{96DAC541-7B7A-43D3-8B79-37D633B846F1}">
+                <asvg:svgBlip xmlns:asvg="http://schemas.microsoft.com/office/drawing/2016/SVG/main" r:embed="rId7"/>
+              </a:ext>
+            </a:extLst>
+          </a:blip>
+          <a:stretch>
+            <a:fillRect/>
+          </a:stretch>
+        </p:blipFill>
+        <p:spPr>
+          <a:xfrm>
+            <a:off x="9680232" y="4220093"/>
+            <a:ext cx="1338773" cy="1338773"/>
+          </a:xfrm>
+          <a:prstGeom prst="rect">
+            <a:avLst/>
+          </a:prstGeom>
+        </p:spPr>
+      </p:pic>
+      <p:pic>
+        <p:nvPicPr>
+          <p:cNvPr id="13" name="图形 12" descr="居家办公 Wi-Fi 轮廓">
+            <a:extLst>
+              <a:ext uri="{FF2B5EF4-FFF2-40B4-BE49-F238E27FC236}">
+                <a16:creationId xmlns:a16="http://schemas.microsoft.com/office/drawing/2014/main" id="{99EE22EC-E065-C7E9-22CC-369DB9FBBF51}"/>
+              </a:ext>
+            </a:extLst>
+          </p:cNvPr>
+          <p:cNvPicPr>
+            <a:picLocks noChangeAspect="1"/>
+          </p:cNvPicPr>
+          <p:nvPr/>
+        </p:nvPicPr>
+        <p:blipFill>
+          <a:blip r:embed="rId8">
+            <a:extLst>
+              <a:ext uri="{28A0092B-C50C-407E-A947-70E740481C1C}">
+                <a14:useLocalDpi xmlns:a14="http://schemas.microsoft.com/office/drawing/2010/main" val="0"/>
+              </a:ext>
+              <a:ext uri="{96DAC541-7B7A-43D3-8B79-37D633B846F1}">
+                <asvg:svgBlip xmlns:asvg="http://schemas.microsoft.com/office/drawing/2016/SVG/main" r:embed="rId9"/>
+              </a:ext>
+            </a:extLst>
+          </a:blip>
+          <a:stretch>
+            <a:fillRect/>
+          </a:stretch>
+        </p:blipFill>
+        <p:spPr>
+          <a:xfrm>
+            <a:off x="8207582" y="4220093"/>
+            <a:ext cx="1338773" cy="1338773"/>
+          </a:xfrm>
+          <a:prstGeom prst="rect">
+            <a:avLst/>
+          </a:prstGeom>
+        </p:spPr>
+      </p:pic>
     </p:spTree>
     <p:extLst>
       <p:ext uri="{BB962C8B-B14F-4D97-AF65-F5344CB8AC3E}">
-        <p14:creationId xmlns:p14="http://schemas.microsoft.com/office/powerpoint/2010/main" val="433792788"/>
+        <p14:creationId xmlns:p14="http://schemas.microsoft.com/office/powerpoint/2010/main" val="2067688863"/>
       </p:ext>
     </p:extLst>
   </p:cSld>

</xml_diff>